<commit_message>
ulm added and changed
</commit_message>
<xml_diff>
--- a/Diagrama Classes e Site/Apresentacao Projeto 1.pptx
+++ b/Diagrama Classes e Site/Apresentacao Projeto 1.pptx
@@ -117,6 +117,11 @@
       </a:defRPr>
     </a:lvl9pPr>
   </p:defaultTextStyle>
+  <p:extLst>
+    <p:ext uri="{EFAFB233-063F-42B5-8137-9DF3F51BA10A}">
+      <p15:sldGuideLst xmlns:p15="http://schemas.microsoft.com/office/powerpoint/2012/main"/>
+    </p:ext>
+  </p:extLst>
 </p:presentation>
 </file>
 
@@ -177,7 +182,7 @@
           <a:noFill/>
           <a:extLst>
             <a:ext uri="{909E8E84-426E-40dd-AFC4-6F175D3DCCD1}">
-              <a14:hiddenFill xmlns:a14="http://schemas.microsoft.com/office/drawing/2010/main" xmlns="">
+              <a14:hiddenFill xmlns="" xmlns:a14="http://schemas.microsoft.com/office/drawing/2010/main">
                 <a:solidFill>
                   <a:srgbClr val="FFFFFF"/>
                 </a:solidFill>
@@ -236,7 +241,7 @@
             </a:ln>
             <a:extLst>
               <a:ext uri="{91240B29-F687-4f45-9708-019B960494DF}">
-                <a14:hiddenLine xmlns:a14="http://schemas.microsoft.com/office/drawing/2010/main" xmlns="" w="9525">
+                <a14:hiddenLine xmlns="" xmlns:a14="http://schemas.microsoft.com/office/drawing/2010/main" w="9525">
                   <a:solidFill>
                     <a:srgbClr val="000000"/>
                   </a:solidFill>
@@ -326,7 +331,7 @@
             </a:ln>
             <a:extLst>
               <a:ext uri="{91240B29-F687-4f45-9708-019B960494DF}">
-                <a14:hiddenLine xmlns:a14="http://schemas.microsoft.com/office/drawing/2010/main" xmlns="" w="9525">
+                <a14:hiddenLine xmlns="" xmlns:a14="http://schemas.microsoft.com/office/drawing/2010/main" w="9525">
                   <a:solidFill>
                     <a:srgbClr val="000000"/>
                   </a:solidFill>
@@ -416,7 +421,7 @@
             </a:ln>
             <a:extLst>
               <a:ext uri="{91240B29-F687-4f45-9708-019B960494DF}">
-                <a14:hiddenLine xmlns:a14="http://schemas.microsoft.com/office/drawing/2010/main" xmlns="" w="9525">
+                <a14:hiddenLine xmlns="" xmlns:a14="http://schemas.microsoft.com/office/drawing/2010/main" w="9525">
                   <a:solidFill>
                     <a:srgbClr val="000000"/>
                   </a:solidFill>
@@ -450,7 +455,7 @@
             </a:ln>
             <a:extLst>
               <a:ext uri="{91240B29-F687-4f45-9708-019B960494DF}">
-                <a14:hiddenLine xmlns:a14="http://schemas.microsoft.com/office/drawing/2010/main" xmlns="" w="9525">
+                <a14:hiddenLine xmlns="" xmlns:a14="http://schemas.microsoft.com/office/drawing/2010/main" w="9525">
                   <a:solidFill>
                     <a:srgbClr val="000000"/>
                   </a:solidFill>
@@ -540,7 +545,7 @@
             </a:ln>
             <a:extLst>
               <a:ext uri="{91240B29-F687-4f45-9708-019B960494DF}">
-                <a14:hiddenLine xmlns:a14="http://schemas.microsoft.com/office/drawing/2010/main" xmlns="" w="9525">
+                <a14:hiddenLine xmlns="" xmlns:a14="http://schemas.microsoft.com/office/drawing/2010/main" w="9525">
                   <a:solidFill>
                     <a:srgbClr val="000000"/>
                   </a:solidFill>
@@ -602,7 +607,7 @@
             </a:ln>
             <a:extLst>
               <a:ext uri="{91240B29-F687-4f45-9708-019B960494DF}">
-                <a14:hiddenLine xmlns:a14="http://schemas.microsoft.com/office/drawing/2010/main" xmlns="" w="9525">
+                <a14:hiddenLine xmlns="" xmlns:a14="http://schemas.microsoft.com/office/drawing/2010/main" w="9525">
                   <a:solidFill>
                     <a:srgbClr val="000000"/>
                   </a:solidFill>
@@ -664,7 +669,7 @@
             </a:ln>
             <a:extLst>
               <a:ext uri="{91240B29-F687-4f45-9708-019B960494DF}">
-                <a14:hiddenLine xmlns:a14="http://schemas.microsoft.com/office/drawing/2010/main" xmlns="" w="9525">
+                <a14:hiddenLine xmlns="" xmlns:a14="http://schemas.microsoft.com/office/drawing/2010/main" w="9525">
                   <a:solidFill>
                     <a:srgbClr val="000000"/>
                   </a:solidFill>
@@ -754,7 +759,7 @@
             </a:ln>
             <a:extLst>
               <a:ext uri="{91240B29-F687-4f45-9708-019B960494DF}">
-                <a14:hiddenLine xmlns:a14="http://schemas.microsoft.com/office/drawing/2010/main" xmlns="" w="9525">
+                <a14:hiddenLine xmlns="" xmlns:a14="http://schemas.microsoft.com/office/drawing/2010/main" w="9525">
                   <a:solidFill>
                     <a:srgbClr val="000000"/>
                   </a:solidFill>
@@ -816,7 +821,7 @@
             </a:ln>
             <a:extLst>
               <a:ext uri="{91240B29-F687-4f45-9708-019B960494DF}">
-                <a14:hiddenLine xmlns:a14="http://schemas.microsoft.com/office/drawing/2010/main" xmlns="" w="9525">
+                <a14:hiddenLine xmlns="" xmlns:a14="http://schemas.microsoft.com/office/drawing/2010/main" w="9525">
                   <a:solidFill>
                     <a:srgbClr val="000000"/>
                   </a:solidFill>
@@ -878,7 +883,7 @@
             </a:ln>
             <a:extLst>
               <a:ext uri="{91240B29-F687-4f45-9708-019B960494DF}">
-                <a14:hiddenLine xmlns:a14="http://schemas.microsoft.com/office/drawing/2010/main" xmlns="" w="9525">
+                <a14:hiddenLine xmlns="" xmlns:a14="http://schemas.microsoft.com/office/drawing/2010/main" w="9525">
                   <a:solidFill>
                     <a:srgbClr val="000000"/>
                   </a:solidFill>
@@ -968,7 +973,7 @@
             </a:ln>
             <a:extLst>
               <a:ext uri="{91240B29-F687-4f45-9708-019B960494DF}">
-                <a14:hiddenLine xmlns:a14="http://schemas.microsoft.com/office/drawing/2010/main" xmlns="" w="9525">
+                <a14:hiddenLine xmlns="" xmlns:a14="http://schemas.microsoft.com/office/drawing/2010/main" w="9525">
                   <a:solidFill>
                     <a:srgbClr val="000000"/>
                   </a:solidFill>
@@ -1058,7 +1063,7 @@
             </a:ln>
             <a:extLst>
               <a:ext uri="{91240B29-F687-4f45-9708-019B960494DF}">
-                <a14:hiddenLine xmlns:a14="http://schemas.microsoft.com/office/drawing/2010/main" xmlns="" w="9525">
+                <a14:hiddenLine xmlns="" xmlns:a14="http://schemas.microsoft.com/office/drawing/2010/main" w="9525">
                   <a:solidFill>
                     <a:srgbClr val="000000"/>
                   </a:solidFill>
@@ -1120,7 +1125,7 @@
             </a:ln>
             <a:extLst>
               <a:ext uri="{91240B29-F687-4f45-9708-019B960494DF}">
-                <a14:hiddenLine xmlns:a14="http://schemas.microsoft.com/office/drawing/2010/main" xmlns="" w="9525">
+                <a14:hiddenLine xmlns="" xmlns:a14="http://schemas.microsoft.com/office/drawing/2010/main" w="9525">
                   <a:solidFill>
                     <a:srgbClr val="000000"/>
                   </a:solidFill>
@@ -1230,7 +1235,7 @@
             </a:ln>
             <a:extLst>
               <a:ext uri="{91240B29-F687-4f45-9708-019B960494DF}">
-                <a14:hiddenLine xmlns:a14="http://schemas.microsoft.com/office/drawing/2010/main" xmlns="" w="9525">
+                <a14:hiddenLine xmlns="" xmlns:a14="http://schemas.microsoft.com/office/drawing/2010/main" w="9525">
                   <a:solidFill>
                     <a:srgbClr val="000000"/>
                   </a:solidFill>
@@ -1292,7 +1297,7 @@
             </a:ln>
             <a:extLst>
               <a:ext uri="{91240B29-F687-4f45-9708-019B960494DF}">
-                <a14:hiddenLine xmlns:a14="http://schemas.microsoft.com/office/drawing/2010/main" xmlns="" w="9525">
+                <a14:hiddenLine xmlns="" xmlns:a14="http://schemas.microsoft.com/office/drawing/2010/main" w="9525">
                   <a:solidFill>
                     <a:srgbClr val="000000"/>
                   </a:solidFill>
@@ -1382,7 +1387,7 @@
             </a:ln>
             <a:extLst>
               <a:ext uri="{91240B29-F687-4f45-9708-019B960494DF}">
-                <a14:hiddenLine xmlns:a14="http://schemas.microsoft.com/office/drawing/2010/main" xmlns="" w="9525">
+                <a14:hiddenLine xmlns="" xmlns:a14="http://schemas.microsoft.com/office/drawing/2010/main" w="9525">
                   <a:solidFill>
                     <a:srgbClr val="000000"/>
                   </a:solidFill>
@@ -1472,7 +1477,7 @@
             </a:ln>
             <a:extLst>
               <a:ext uri="{91240B29-F687-4f45-9708-019B960494DF}">
-                <a14:hiddenLine xmlns:a14="http://schemas.microsoft.com/office/drawing/2010/main" xmlns="" w="9525">
+                <a14:hiddenLine xmlns="" xmlns:a14="http://schemas.microsoft.com/office/drawing/2010/main" w="9525">
                   <a:solidFill>
                     <a:srgbClr val="000000"/>
                   </a:solidFill>
@@ -1534,7 +1539,7 @@
             </a:ln>
             <a:extLst>
               <a:ext uri="{91240B29-F687-4f45-9708-019B960494DF}">
-                <a14:hiddenLine xmlns:a14="http://schemas.microsoft.com/office/drawing/2010/main" xmlns="" w="9525">
+                <a14:hiddenLine xmlns="" xmlns:a14="http://schemas.microsoft.com/office/drawing/2010/main" w="9525">
                   <a:solidFill>
                     <a:srgbClr val="000000"/>
                   </a:solidFill>
@@ -1624,7 +1629,7 @@
             </a:ln>
             <a:extLst>
               <a:ext uri="{91240B29-F687-4f45-9708-019B960494DF}">
-                <a14:hiddenLine xmlns:a14="http://schemas.microsoft.com/office/drawing/2010/main" xmlns="" w="9525">
+                <a14:hiddenLine xmlns="" xmlns:a14="http://schemas.microsoft.com/office/drawing/2010/main" w="9525">
                   <a:solidFill>
                     <a:srgbClr val="000000"/>
                   </a:solidFill>
@@ -1714,7 +1719,7 @@
             </a:ln>
             <a:extLst>
               <a:ext uri="{91240B29-F687-4f45-9708-019B960494DF}">
-                <a14:hiddenLine xmlns:a14="http://schemas.microsoft.com/office/drawing/2010/main" xmlns="" w="9525">
+                <a14:hiddenLine xmlns="" xmlns:a14="http://schemas.microsoft.com/office/drawing/2010/main" w="9525">
                   <a:solidFill>
                     <a:srgbClr val="000000"/>
                   </a:solidFill>
@@ -1770,7 +1775,7 @@
             </a:ln>
             <a:extLst>
               <a:ext uri="{91240B29-F687-4f45-9708-019B960494DF}">
-                <a14:hiddenLine xmlns:a14="http://schemas.microsoft.com/office/drawing/2010/main" xmlns="" w="9525">
+                <a14:hiddenLine xmlns="" xmlns:a14="http://schemas.microsoft.com/office/drawing/2010/main" w="9525">
                   <a:solidFill>
                     <a:srgbClr val="000000"/>
                   </a:solidFill>
@@ -1860,7 +1865,7 @@
             </a:ln>
             <a:extLst>
               <a:ext uri="{91240B29-F687-4f45-9708-019B960494DF}">
-                <a14:hiddenLine xmlns:a14="http://schemas.microsoft.com/office/drawing/2010/main" xmlns="" w="9525">
+                <a14:hiddenLine xmlns="" xmlns:a14="http://schemas.microsoft.com/office/drawing/2010/main" w="9525">
                   <a:solidFill>
                     <a:srgbClr val="000000"/>
                   </a:solidFill>
@@ -1916,7 +1921,7 @@
             </a:ln>
             <a:extLst>
               <a:ext uri="{91240B29-F687-4f45-9708-019B960494DF}">
-                <a14:hiddenLine xmlns:a14="http://schemas.microsoft.com/office/drawing/2010/main" xmlns="" w="9525">
+                <a14:hiddenLine xmlns="" xmlns:a14="http://schemas.microsoft.com/office/drawing/2010/main" w="9525">
                   <a:solidFill>
                     <a:srgbClr val="000000"/>
                   </a:solidFill>
@@ -2006,7 +2011,7 @@
             </a:ln>
             <a:extLst>
               <a:ext uri="{91240B29-F687-4f45-9708-019B960494DF}">
-                <a14:hiddenLine xmlns:a14="http://schemas.microsoft.com/office/drawing/2010/main" xmlns="" w="9525">
+                <a14:hiddenLine xmlns="" xmlns:a14="http://schemas.microsoft.com/office/drawing/2010/main" w="9525">
                   <a:solidFill>
                     <a:srgbClr val="000000"/>
                   </a:solidFill>
@@ -2074,7 +2079,7 @@
             </a:ln>
             <a:extLst>
               <a:ext uri="{91240B29-F687-4f45-9708-019B960494DF}">
-                <a14:hiddenLine xmlns:a14="http://schemas.microsoft.com/office/drawing/2010/main" xmlns="" w="9525">
+                <a14:hiddenLine xmlns="" xmlns:a14="http://schemas.microsoft.com/office/drawing/2010/main" w="9525">
                   <a:solidFill>
                     <a:srgbClr val="000000"/>
                   </a:solidFill>
@@ -2164,7 +2169,7 @@
             </a:ln>
             <a:extLst>
               <a:ext uri="{91240B29-F687-4f45-9708-019B960494DF}">
-                <a14:hiddenLine xmlns:a14="http://schemas.microsoft.com/office/drawing/2010/main" xmlns="" w="9525">
+                <a14:hiddenLine xmlns="" xmlns:a14="http://schemas.microsoft.com/office/drawing/2010/main" w="9525">
                   <a:solidFill>
                     <a:srgbClr val="000000"/>
                   </a:solidFill>
@@ -2232,7 +2237,7 @@
             </a:ln>
             <a:extLst>
               <a:ext uri="{91240B29-F687-4f45-9708-019B960494DF}">
-                <a14:hiddenLine xmlns:a14="http://schemas.microsoft.com/office/drawing/2010/main" xmlns="" w="9525">
+                <a14:hiddenLine xmlns="" xmlns:a14="http://schemas.microsoft.com/office/drawing/2010/main" w="9525">
                   <a:solidFill>
                     <a:srgbClr val="000000"/>
                   </a:solidFill>
@@ -2322,7 +2327,7 @@
             </a:ln>
             <a:extLst>
               <a:ext uri="{91240B29-F687-4f45-9708-019B960494DF}">
-                <a14:hiddenLine xmlns:a14="http://schemas.microsoft.com/office/drawing/2010/main" xmlns="" w="9525">
+                <a14:hiddenLine xmlns="" xmlns:a14="http://schemas.microsoft.com/office/drawing/2010/main" w="9525">
                   <a:solidFill>
                     <a:srgbClr val="000000"/>
                   </a:solidFill>
@@ -2356,7 +2361,7 @@
             </a:ln>
             <a:extLst>
               <a:ext uri="{91240B29-F687-4f45-9708-019B960494DF}">
-                <a14:hiddenLine xmlns:a14="http://schemas.microsoft.com/office/drawing/2010/main" xmlns="" w="9525">
+                <a14:hiddenLine xmlns="" xmlns:a14="http://schemas.microsoft.com/office/drawing/2010/main" w="9525">
                   <a:solidFill>
                     <a:srgbClr val="000000"/>
                   </a:solidFill>
@@ -2446,7 +2451,7 @@
             </a:ln>
             <a:extLst>
               <a:ext uri="{91240B29-F687-4f45-9708-019B960494DF}">
-                <a14:hiddenLine xmlns:a14="http://schemas.microsoft.com/office/drawing/2010/main" xmlns="" w="9525">
+                <a14:hiddenLine xmlns="" xmlns:a14="http://schemas.microsoft.com/office/drawing/2010/main" w="9525">
                   <a:solidFill>
                     <a:srgbClr val="000000"/>
                   </a:solidFill>
@@ -2508,7 +2513,7 @@
             </a:ln>
             <a:extLst>
               <a:ext uri="{91240B29-F687-4f45-9708-019B960494DF}">
-                <a14:hiddenLine xmlns:a14="http://schemas.microsoft.com/office/drawing/2010/main" xmlns="" w="9525">
+                <a14:hiddenLine xmlns="" xmlns:a14="http://schemas.microsoft.com/office/drawing/2010/main" w="9525">
                   <a:solidFill>
                     <a:srgbClr val="000000"/>
                   </a:solidFill>
@@ -2570,7 +2575,7 @@
             </a:ln>
             <a:extLst>
               <a:ext uri="{91240B29-F687-4f45-9708-019B960494DF}">
-                <a14:hiddenLine xmlns:a14="http://schemas.microsoft.com/office/drawing/2010/main" xmlns="" w="9525">
+                <a14:hiddenLine xmlns="" xmlns:a14="http://schemas.microsoft.com/office/drawing/2010/main" w="9525">
                   <a:solidFill>
                     <a:srgbClr val="000000"/>
                   </a:solidFill>
@@ -2660,7 +2665,7 @@
             </a:ln>
             <a:extLst>
               <a:ext uri="{91240B29-F687-4f45-9708-019B960494DF}">
-                <a14:hiddenLine xmlns:a14="http://schemas.microsoft.com/office/drawing/2010/main" xmlns="" w="9525">
+                <a14:hiddenLine xmlns="" xmlns:a14="http://schemas.microsoft.com/office/drawing/2010/main" w="9525">
                   <a:solidFill>
                     <a:srgbClr val="000000"/>
                   </a:solidFill>
@@ -2728,7 +2733,7 @@
             </a:ln>
             <a:extLst>
               <a:ext uri="{91240B29-F687-4f45-9708-019B960494DF}">
-                <a14:hiddenLine xmlns:a14="http://schemas.microsoft.com/office/drawing/2010/main" xmlns="" w="9525">
+                <a14:hiddenLine xmlns="" xmlns:a14="http://schemas.microsoft.com/office/drawing/2010/main" w="9525">
                   <a:solidFill>
                     <a:srgbClr val="000000"/>
                   </a:solidFill>
@@ -2790,7 +2795,7 @@
             </a:ln>
             <a:extLst>
               <a:ext uri="{91240B29-F687-4f45-9708-019B960494DF}">
-                <a14:hiddenLine xmlns:a14="http://schemas.microsoft.com/office/drawing/2010/main" xmlns="" w="9525">
+                <a14:hiddenLine xmlns="" xmlns:a14="http://schemas.microsoft.com/office/drawing/2010/main" w="9525">
                   <a:solidFill>
                     <a:srgbClr val="000000"/>
                   </a:solidFill>
@@ -2880,7 +2885,7 @@
             </a:ln>
             <a:extLst>
               <a:ext uri="{91240B29-F687-4f45-9708-019B960494DF}">
-                <a14:hiddenLine xmlns:a14="http://schemas.microsoft.com/office/drawing/2010/main" xmlns="" w="9525">
+                <a14:hiddenLine xmlns="" xmlns:a14="http://schemas.microsoft.com/office/drawing/2010/main" w="9525">
                   <a:solidFill>
                     <a:srgbClr val="000000"/>
                   </a:solidFill>
@@ -2942,7 +2947,7 @@
             </a:ln>
             <a:extLst>
               <a:ext uri="{91240B29-F687-4f45-9708-019B960494DF}">
-                <a14:hiddenLine xmlns:a14="http://schemas.microsoft.com/office/drawing/2010/main" xmlns="" w="9525">
+                <a14:hiddenLine xmlns="" xmlns:a14="http://schemas.microsoft.com/office/drawing/2010/main" w="9525">
                   <a:solidFill>
                     <a:srgbClr val="000000"/>
                   </a:solidFill>
@@ -3032,7 +3037,7 @@
             </a:ln>
             <a:extLst>
               <a:ext uri="{91240B29-F687-4f45-9708-019B960494DF}">
-                <a14:hiddenLine xmlns:a14="http://schemas.microsoft.com/office/drawing/2010/main" xmlns="" w="9525">
+                <a14:hiddenLine xmlns="" xmlns:a14="http://schemas.microsoft.com/office/drawing/2010/main" w="9525">
                   <a:solidFill>
                     <a:srgbClr val="000000"/>
                   </a:solidFill>
@@ -3094,7 +3099,7 @@
             </a:ln>
             <a:extLst>
               <a:ext uri="{91240B29-F687-4f45-9708-019B960494DF}">
-                <a14:hiddenLine xmlns:a14="http://schemas.microsoft.com/office/drawing/2010/main" xmlns="" w="9525">
+                <a14:hiddenLine xmlns="" xmlns:a14="http://schemas.microsoft.com/office/drawing/2010/main" w="9525">
                   <a:solidFill>
                     <a:srgbClr val="000000"/>
                   </a:solidFill>
@@ -3184,7 +3189,7 @@
             </a:ln>
             <a:extLst>
               <a:ext uri="{91240B29-F687-4f45-9708-019B960494DF}">
-                <a14:hiddenLine xmlns:a14="http://schemas.microsoft.com/office/drawing/2010/main" xmlns="" w="9525">
+                <a14:hiddenLine xmlns="" xmlns:a14="http://schemas.microsoft.com/office/drawing/2010/main" w="9525">
                   <a:solidFill>
                     <a:srgbClr val="000000"/>
                   </a:solidFill>
@@ -3218,7 +3223,7 @@
             </a:ln>
             <a:extLst>
               <a:ext uri="{91240B29-F687-4f45-9708-019B960494DF}">
-                <a14:hiddenLine xmlns:a14="http://schemas.microsoft.com/office/drawing/2010/main" xmlns="" w="9525">
+                <a14:hiddenLine xmlns="" xmlns:a14="http://schemas.microsoft.com/office/drawing/2010/main" w="9525">
                   <a:solidFill>
                     <a:srgbClr val="000000"/>
                   </a:solidFill>
@@ -3283,7 +3288,7 @@
             </a:ln>
             <a:extLst>
               <a:ext uri="{91240B29-F687-4f45-9708-019B960494DF}">
-                <a14:hiddenLine xmlns:a14="http://schemas.microsoft.com/office/drawing/2010/main" xmlns="" w="9525">
+                <a14:hiddenLine xmlns="" xmlns:a14="http://schemas.microsoft.com/office/drawing/2010/main" w="9525">
                   <a:solidFill>
                     <a:srgbClr val="000000"/>
                   </a:solidFill>
@@ -3373,7 +3378,7 @@
             </a:ln>
             <a:extLst>
               <a:ext uri="{91240B29-F687-4f45-9708-019B960494DF}">
-                <a14:hiddenLine xmlns:a14="http://schemas.microsoft.com/office/drawing/2010/main" xmlns="" w="9525">
+                <a14:hiddenLine xmlns="" xmlns:a14="http://schemas.microsoft.com/office/drawing/2010/main" w="9525">
                   <a:solidFill>
                     <a:srgbClr val="000000"/>
                   </a:solidFill>
@@ -3435,7 +3440,7 @@
             </a:ln>
             <a:extLst>
               <a:ext uri="{91240B29-F687-4f45-9708-019B960494DF}">
-                <a14:hiddenLine xmlns:a14="http://schemas.microsoft.com/office/drawing/2010/main" xmlns="" w="9525">
+                <a14:hiddenLine xmlns="" xmlns:a14="http://schemas.microsoft.com/office/drawing/2010/main" w="9525">
                   <a:solidFill>
                     <a:srgbClr val="000000"/>
                   </a:solidFill>
@@ -3525,7 +3530,7 @@
             </a:ln>
             <a:extLst>
               <a:ext uri="{91240B29-F687-4f45-9708-019B960494DF}">
-                <a14:hiddenLine xmlns:a14="http://schemas.microsoft.com/office/drawing/2010/main" xmlns="" w="9525">
+                <a14:hiddenLine xmlns="" xmlns:a14="http://schemas.microsoft.com/office/drawing/2010/main" w="9525">
                   <a:solidFill>
                     <a:srgbClr val="000000"/>
                   </a:solidFill>
@@ -3615,7 +3620,7 @@
             </a:ln>
             <a:extLst>
               <a:ext uri="{91240B29-F687-4f45-9708-019B960494DF}">
-                <a14:hiddenLine xmlns:a14="http://schemas.microsoft.com/office/drawing/2010/main" xmlns="" w="9525">
+                <a14:hiddenLine xmlns="" xmlns:a14="http://schemas.microsoft.com/office/drawing/2010/main" w="9525">
                   <a:solidFill>
                     <a:srgbClr val="000000"/>
                   </a:solidFill>
@@ -3680,7 +3685,7 @@
             </a:ln>
             <a:extLst>
               <a:ext uri="{91240B29-F687-4f45-9708-019B960494DF}">
-                <a14:hiddenLine xmlns:a14="http://schemas.microsoft.com/office/drawing/2010/main" xmlns="" w="9525">
+                <a14:hiddenLine xmlns="" xmlns:a14="http://schemas.microsoft.com/office/drawing/2010/main" w="9525">
                   <a:solidFill>
                     <a:srgbClr val="000000"/>
                   </a:solidFill>
@@ -3742,7 +3747,7 @@
             </a:ln>
             <a:extLst>
               <a:ext uri="{91240B29-F687-4f45-9708-019B960494DF}">
-                <a14:hiddenLine xmlns:a14="http://schemas.microsoft.com/office/drawing/2010/main" xmlns="" w="9525">
+                <a14:hiddenLine xmlns="" xmlns:a14="http://schemas.microsoft.com/office/drawing/2010/main" w="9525">
                   <a:solidFill>
                     <a:srgbClr val="000000"/>
                   </a:solidFill>
@@ -3832,7 +3837,7 @@
             </a:ln>
             <a:extLst>
               <a:ext uri="{91240B29-F687-4f45-9708-019B960494DF}">
-                <a14:hiddenLine xmlns:a14="http://schemas.microsoft.com/office/drawing/2010/main" xmlns="" w="9525">
+                <a14:hiddenLine xmlns="" xmlns:a14="http://schemas.microsoft.com/office/drawing/2010/main" w="9525">
                   <a:solidFill>
                     <a:srgbClr val="000000"/>
                   </a:solidFill>
@@ -3922,7 +3927,7 @@
             </a:ln>
             <a:extLst>
               <a:ext uri="{91240B29-F687-4f45-9708-019B960494DF}">
-                <a14:hiddenLine xmlns:a14="http://schemas.microsoft.com/office/drawing/2010/main" xmlns="" w="9525">
+                <a14:hiddenLine xmlns="" xmlns:a14="http://schemas.microsoft.com/office/drawing/2010/main" w="9525">
                   <a:solidFill>
                     <a:srgbClr val="000000"/>
                   </a:solidFill>
@@ -3984,7 +3989,7 @@
             </a:ln>
             <a:extLst>
               <a:ext uri="{91240B29-F687-4f45-9708-019B960494DF}">
-                <a14:hiddenLine xmlns:a14="http://schemas.microsoft.com/office/drawing/2010/main" xmlns="" w="9525">
+                <a14:hiddenLine xmlns="" xmlns:a14="http://schemas.microsoft.com/office/drawing/2010/main" w="9525">
                   <a:solidFill>
                     <a:srgbClr val="000000"/>
                   </a:solidFill>
@@ -4104,7 +4109,7 @@
             </a:ln>
             <a:extLst>
               <a:ext uri="{91240B29-F687-4f45-9708-019B960494DF}">
-                <a14:hiddenLine xmlns:a14="http://schemas.microsoft.com/office/drawing/2010/main" xmlns="" w="9525">
+                <a14:hiddenLine xmlns="" xmlns:a14="http://schemas.microsoft.com/office/drawing/2010/main" w="9525">
                   <a:solidFill>
                     <a:srgbClr val="000000"/>
                   </a:solidFill>
@@ -4172,7 +4177,7 @@
             </a:ln>
             <a:extLst>
               <a:ext uri="{91240B29-F687-4f45-9708-019B960494DF}">
-                <a14:hiddenLine xmlns:a14="http://schemas.microsoft.com/office/drawing/2010/main" xmlns="" w="9525">
+                <a14:hiddenLine xmlns="" xmlns:a14="http://schemas.microsoft.com/office/drawing/2010/main" w="9525">
                   <a:solidFill>
                     <a:srgbClr val="000000"/>
                   </a:solidFill>
@@ -4262,7 +4267,7 @@
             </a:ln>
             <a:extLst>
               <a:ext uri="{91240B29-F687-4f45-9708-019B960494DF}">
-                <a14:hiddenLine xmlns:a14="http://schemas.microsoft.com/office/drawing/2010/main" xmlns="" w="9525">
+                <a14:hiddenLine xmlns="" xmlns:a14="http://schemas.microsoft.com/office/drawing/2010/main" w="9525">
                   <a:solidFill>
                     <a:srgbClr val="000000"/>
                   </a:solidFill>
@@ -4402,7 +4407,7 @@
           <a:p>
             <a:fld id="{48A87A34-81AB-432B-8DAE-1953F412C126}" type="datetimeFigureOut">
               <a:rPr lang="en-US" dirty="0"/>
-              <a:t>11/19/2020</a:t>
+              <a:t>11/20/2020</a:t>
             </a:fld>
             <a:endParaRPr lang="en-US" dirty="0"/>
           </a:p>
@@ -4664,7 +4669,7 @@
           <a:p>
             <a:fld id="{48A87A34-81AB-432B-8DAE-1953F412C126}" type="datetimeFigureOut">
               <a:rPr lang="en-US" dirty="0"/>
-              <a:t>11/19/2020</a:t>
+              <a:t>11/20/2020</a:t>
             </a:fld>
             <a:endParaRPr lang="en-US" dirty="0"/>
           </a:p>
@@ -4855,7 +4860,7 @@
           <a:p>
             <a:fld id="{48A87A34-81AB-432B-8DAE-1953F412C126}" type="datetimeFigureOut">
               <a:rPr lang="en-US" dirty="0"/>
-              <a:t>11/19/2020</a:t>
+              <a:t>11/20/2020</a:t>
             </a:fld>
             <a:endParaRPr lang="en-US" dirty="0"/>
           </a:p>
@@ -5113,7 +5118,7 @@
           <a:p>
             <a:fld id="{48A87A34-81AB-432B-8DAE-1953F412C126}" type="datetimeFigureOut">
               <a:rPr lang="en-US" dirty="0"/>
-              <a:t>11/19/2020</a:t>
+              <a:t>11/20/2020</a:t>
             </a:fld>
             <a:endParaRPr lang="en-US" dirty="0"/>
           </a:p>
@@ -5542,7 +5547,7 @@
           <a:p>
             <a:fld id="{48A87A34-81AB-432B-8DAE-1953F412C126}" type="datetimeFigureOut">
               <a:rPr lang="en-US" dirty="0"/>
-              <a:t>11/19/2020</a:t>
+              <a:t>11/20/2020</a:t>
             </a:fld>
             <a:endParaRPr lang="en-US" dirty="0"/>
           </a:p>
@@ -6083,7 +6088,7 @@
           <a:p>
             <a:fld id="{48A87A34-81AB-432B-8DAE-1953F412C126}" type="datetimeFigureOut">
               <a:rPr lang="en-US" dirty="0"/>
-              <a:t>11/19/2020</a:t>
+              <a:t>11/20/2020</a:t>
             </a:fld>
             <a:endParaRPr lang="en-US" dirty="0"/>
           </a:p>
@@ -6798,7 +6803,7 @@
           <a:p>
             <a:fld id="{48A87A34-81AB-432B-8DAE-1953F412C126}" type="datetimeFigureOut">
               <a:rPr lang="en-US" dirty="0"/>
-              <a:t>11/19/2020</a:t>
+              <a:t>11/20/2020</a:t>
             </a:fld>
             <a:endParaRPr lang="en-US" dirty="0"/>
           </a:p>
@@ -6963,7 +6968,7 @@
           <a:p>
             <a:fld id="{48A87A34-81AB-432B-8DAE-1953F412C126}" type="datetimeFigureOut">
               <a:rPr lang="en-US" dirty="0"/>
-              <a:t>11/19/2020</a:t>
+              <a:t>11/20/2020</a:t>
             </a:fld>
             <a:endParaRPr lang="en-US" dirty="0"/>
           </a:p>
@@ -7138,7 +7143,7 @@
           <a:p>
             <a:fld id="{48A87A34-81AB-432B-8DAE-1953F412C126}" type="datetimeFigureOut">
               <a:rPr lang="en-US" dirty="0"/>
-              <a:t>11/19/2020</a:t>
+              <a:t>11/20/2020</a:t>
             </a:fld>
             <a:endParaRPr lang="en-US" dirty="0"/>
           </a:p>
@@ -7303,7 +7308,7 @@
           <a:p>
             <a:fld id="{48A87A34-81AB-432B-8DAE-1953F412C126}" type="datetimeFigureOut">
               <a:rPr lang="en-US" dirty="0"/>
-              <a:t>11/19/2020</a:t>
+              <a:t>11/20/2020</a:t>
             </a:fld>
             <a:endParaRPr lang="en-US" dirty="0"/>
           </a:p>
@@ -7548,7 +7553,7 @@
           <a:p>
             <a:fld id="{48A87A34-81AB-432B-8DAE-1953F412C126}" type="datetimeFigureOut">
               <a:rPr lang="en-US" dirty="0"/>
-              <a:t>11/19/2020</a:t>
+              <a:t>11/20/2020</a:t>
             </a:fld>
             <a:endParaRPr lang="en-US" dirty="0"/>
           </a:p>
@@ -7775,7 +7780,7 @@
           <a:p>
             <a:fld id="{48A87A34-81AB-432B-8DAE-1953F412C126}" type="datetimeFigureOut">
               <a:rPr lang="en-US" dirty="0"/>
-              <a:t>11/19/2020</a:t>
+              <a:t>11/20/2020</a:t>
             </a:fld>
             <a:endParaRPr lang="en-US" dirty="0"/>
           </a:p>
@@ -8151,7 +8156,7 @@
           <a:p>
             <a:fld id="{48A87A34-81AB-432B-8DAE-1953F412C126}" type="datetimeFigureOut">
               <a:rPr lang="en-US" dirty="0"/>
-              <a:t>11/19/2020</a:t>
+              <a:t>11/20/2020</a:t>
             </a:fld>
             <a:endParaRPr lang="en-US" dirty="0"/>
           </a:p>
@@ -8264,7 +8269,7 @@
           <a:p>
             <a:fld id="{48A87A34-81AB-432B-8DAE-1953F412C126}" type="datetimeFigureOut">
               <a:rPr lang="en-US" dirty="0"/>
-              <a:t>11/19/2020</a:t>
+              <a:t>11/20/2020</a:t>
             </a:fld>
             <a:endParaRPr lang="en-US" dirty="0"/>
           </a:p>
@@ -8354,7 +8359,7 @@
           <a:p>
             <a:fld id="{48A87A34-81AB-432B-8DAE-1953F412C126}" type="datetimeFigureOut">
               <a:rPr lang="en-US" dirty="0"/>
-              <a:t>11/19/2020</a:t>
+              <a:t>11/20/2020</a:t>
             </a:fld>
             <a:endParaRPr lang="en-US" dirty="0"/>
           </a:p>
@@ -8598,7 +8603,7 @@
           <a:p>
             <a:fld id="{48A87A34-81AB-432B-8DAE-1953F412C126}" type="datetimeFigureOut">
               <a:rPr lang="en-US" dirty="0"/>
-              <a:t>11/19/2020</a:t>
+              <a:t>11/20/2020</a:t>
             </a:fld>
             <a:endParaRPr lang="en-US" dirty="0"/>
           </a:p>
@@ -8873,7 +8878,7 @@
           <a:p>
             <a:fld id="{48A87A34-81AB-432B-8DAE-1953F412C126}" type="datetimeFigureOut">
               <a:rPr lang="en-US" dirty="0"/>
-              <a:t>11/19/2020</a:t>
+              <a:t>11/20/2020</a:t>
             </a:fld>
             <a:endParaRPr lang="en-US" dirty="0"/>
           </a:p>
@@ -8991,7 +8996,7 @@
           <a:noFill/>
           <a:extLst>
             <a:ext uri="{909E8E84-426E-40dd-AFC4-6F175D3DCCD1}">
-              <a14:hiddenFill xmlns:a14="http://schemas.microsoft.com/office/drawing/2010/main" xmlns="">
+              <a14:hiddenFill xmlns="" xmlns:a14="http://schemas.microsoft.com/office/drawing/2010/main">
                 <a:solidFill>
                   <a:srgbClr val="FFFFFF"/>
                 </a:solidFill>
@@ -9065,7 +9070,7 @@
               </a:ln>
               <a:extLst>
                 <a:ext uri="{91240B29-F687-4f45-9708-019B960494DF}">
-                  <a14:hiddenLine xmlns:a14="http://schemas.microsoft.com/office/drawing/2010/main" xmlns="" w="9525">
+                  <a14:hiddenLine xmlns="" xmlns:a14="http://schemas.microsoft.com/office/drawing/2010/main" w="9525">
                     <a:solidFill>
                       <a:srgbClr val="000000"/>
                     </a:solidFill>
@@ -9155,7 +9160,7 @@
               </a:ln>
               <a:extLst>
                 <a:ext uri="{91240B29-F687-4f45-9708-019B960494DF}">
-                  <a14:hiddenLine xmlns:a14="http://schemas.microsoft.com/office/drawing/2010/main" xmlns="" w="9525">
+                  <a14:hiddenLine xmlns="" xmlns:a14="http://schemas.microsoft.com/office/drawing/2010/main" w="9525">
                     <a:solidFill>
                       <a:srgbClr val="000000"/>
                     </a:solidFill>
@@ -9245,7 +9250,7 @@
               </a:ln>
               <a:extLst>
                 <a:ext uri="{91240B29-F687-4f45-9708-019B960494DF}">
-                  <a14:hiddenLine xmlns:a14="http://schemas.microsoft.com/office/drawing/2010/main" xmlns="" w="9525">
+                  <a14:hiddenLine xmlns="" xmlns:a14="http://schemas.microsoft.com/office/drawing/2010/main" w="9525">
                     <a:solidFill>
                       <a:srgbClr val="000000"/>
                     </a:solidFill>
@@ -9307,7 +9312,7 @@
               </a:ln>
               <a:extLst>
                 <a:ext uri="{91240B29-F687-4f45-9708-019B960494DF}">
-                  <a14:hiddenLine xmlns:a14="http://schemas.microsoft.com/office/drawing/2010/main" xmlns="" w="9525">
+                  <a14:hiddenLine xmlns="" xmlns:a14="http://schemas.microsoft.com/office/drawing/2010/main" w="9525">
                     <a:solidFill>
                       <a:srgbClr val="000000"/>
                     </a:solidFill>
@@ -9397,7 +9402,7 @@
               </a:ln>
               <a:extLst>
                 <a:ext uri="{91240B29-F687-4f45-9708-019B960494DF}">
-                  <a14:hiddenLine xmlns:a14="http://schemas.microsoft.com/office/drawing/2010/main" xmlns="" w="9525">
+                  <a14:hiddenLine xmlns="" xmlns:a14="http://schemas.microsoft.com/office/drawing/2010/main" w="9525">
                     <a:solidFill>
                       <a:srgbClr val="000000"/>
                     </a:solidFill>
@@ -9459,7 +9464,7 @@
               </a:ln>
               <a:extLst>
                 <a:ext uri="{91240B29-F687-4f45-9708-019B960494DF}">
-                  <a14:hiddenLine xmlns:a14="http://schemas.microsoft.com/office/drawing/2010/main" xmlns="" w="9525">
+                  <a14:hiddenLine xmlns="" xmlns:a14="http://schemas.microsoft.com/office/drawing/2010/main" w="9525">
                     <a:solidFill>
                       <a:srgbClr val="000000"/>
                     </a:solidFill>
@@ -9521,7 +9526,7 @@
               </a:ln>
               <a:extLst>
                 <a:ext uri="{91240B29-F687-4f45-9708-019B960494DF}">
-                  <a14:hiddenLine xmlns:a14="http://schemas.microsoft.com/office/drawing/2010/main" xmlns="" w="9525">
+                  <a14:hiddenLine xmlns="" xmlns:a14="http://schemas.microsoft.com/office/drawing/2010/main" w="9525">
                     <a:solidFill>
                       <a:srgbClr val="000000"/>
                     </a:solidFill>
@@ -9611,7 +9616,7 @@
               </a:ln>
               <a:extLst>
                 <a:ext uri="{91240B29-F687-4f45-9708-019B960494DF}">
-                  <a14:hiddenLine xmlns:a14="http://schemas.microsoft.com/office/drawing/2010/main" xmlns="" w="9525">
+                  <a14:hiddenLine xmlns="" xmlns:a14="http://schemas.microsoft.com/office/drawing/2010/main" w="9525">
                     <a:solidFill>
                       <a:srgbClr val="000000"/>
                     </a:solidFill>
@@ -9701,7 +9706,7 @@
               </a:ln>
               <a:extLst>
                 <a:ext uri="{91240B29-F687-4f45-9708-019B960494DF}">
-                  <a14:hiddenLine xmlns:a14="http://schemas.microsoft.com/office/drawing/2010/main" xmlns="" w="9525">
+                  <a14:hiddenLine xmlns="" xmlns:a14="http://schemas.microsoft.com/office/drawing/2010/main" w="9525">
                     <a:solidFill>
                       <a:srgbClr val="000000"/>
                     </a:solidFill>
@@ -9763,7 +9768,7 @@
               </a:ln>
               <a:extLst>
                 <a:ext uri="{91240B29-F687-4f45-9708-019B960494DF}">
-                  <a14:hiddenLine xmlns:a14="http://schemas.microsoft.com/office/drawing/2010/main" xmlns="" w="9525">
+                  <a14:hiddenLine xmlns="" xmlns:a14="http://schemas.microsoft.com/office/drawing/2010/main" w="9525">
                     <a:solidFill>
                       <a:srgbClr val="000000"/>
                     </a:solidFill>
@@ -9873,7 +9878,7 @@
               </a:ln>
               <a:extLst>
                 <a:ext uri="{91240B29-F687-4f45-9708-019B960494DF}">
-                  <a14:hiddenLine xmlns:a14="http://schemas.microsoft.com/office/drawing/2010/main" xmlns="" w="9525">
+                  <a14:hiddenLine xmlns="" xmlns:a14="http://schemas.microsoft.com/office/drawing/2010/main" w="9525">
                     <a:solidFill>
                       <a:srgbClr val="000000"/>
                     </a:solidFill>
@@ -9957,7 +9962,7 @@
               </a:ln>
               <a:extLst>
                 <a:ext uri="{91240B29-F687-4f45-9708-019B960494DF}">
-                  <a14:hiddenLine xmlns:a14="http://schemas.microsoft.com/office/drawing/2010/main" xmlns="" w="9525">
+                  <a14:hiddenLine xmlns="" xmlns:a14="http://schemas.microsoft.com/office/drawing/2010/main" w="9525">
                     <a:solidFill>
                       <a:srgbClr val="000000"/>
                     </a:solidFill>
@@ -10019,7 +10024,7 @@
               </a:ln>
               <a:extLst>
                 <a:ext uri="{91240B29-F687-4f45-9708-019B960494DF}">
-                  <a14:hiddenLine xmlns:a14="http://schemas.microsoft.com/office/drawing/2010/main" xmlns="" w="9525">
+                  <a14:hiddenLine xmlns="" xmlns:a14="http://schemas.microsoft.com/office/drawing/2010/main" w="9525">
                     <a:solidFill>
                       <a:srgbClr val="000000"/>
                     </a:solidFill>
@@ -10081,7 +10086,7 @@
               </a:ln>
               <a:extLst>
                 <a:ext uri="{91240B29-F687-4f45-9708-019B960494DF}">
-                  <a14:hiddenLine xmlns:a14="http://schemas.microsoft.com/office/drawing/2010/main" xmlns="" w="9525">
+                  <a14:hiddenLine xmlns="" xmlns:a14="http://schemas.microsoft.com/office/drawing/2010/main" w="9525">
                     <a:solidFill>
                       <a:srgbClr val="000000"/>
                     </a:solidFill>
@@ -10171,7 +10176,7 @@
               </a:ln>
               <a:extLst>
                 <a:ext uri="{91240B29-F687-4f45-9708-019B960494DF}">
-                  <a14:hiddenLine xmlns:a14="http://schemas.microsoft.com/office/drawing/2010/main" xmlns="" w="9525">
+                  <a14:hiddenLine xmlns="" xmlns:a14="http://schemas.microsoft.com/office/drawing/2010/main" w="9525">
                     <a:solidFill>
                       <a:srgbClr val="000000"/>
                     </a:solidFill>
@@ -10205,7 +10210,7 @@
               </a:ln>
               <a:extLst>
                 <a:ext uri="{91240B29-F687-4f45-9708-019B960494DF}">
-                  <a14:hiddenLine xmlns:a14="http://schemas.microsoft.com/office/drawing/2010/main" xmlns="" w="9525">
+                  <a14:hiddenLine xmlns="" xmlns:a14="http://schemas.microsoft.com/office/drawing/2010/main" w="9525">
                     <a:solidFill>
                       <a:srgbClr val="000000"/>
                     </a:solidFill>
@@ -10270,7 +10275,7 @@
               </a:ln>
               <a:extLst>
                 <a:ext uri="{91240B29-F687-4f45-9708-019B960494DF}">
-                  <a14:hiddenLine xmlns:a14="http://schemas.microsoft.com/office/drawing/2010/main" xmlns="" w="9525">
+                  <a14:hiddenLine xmlns="" xmlns:a14="http://schemas.microsoft.com/office/drawing/2010/main" w="9525">
                     <a:solidFill>
                       <a:srgbClr val="000000"/>
                     </a:solidFill>
@@ -10360,7 +10365,7 @@
               </a:ln>
               <a:extLst>
                 <a:ext uri="{91240B29-F687-4f45-9708-019B960494DF}">
-                  <a14:hiddenLine xmlns:a14="http://schemas.microsoft.com/office/drawing/2010/main" xmlns="" w="9525">
+                  <a14:hiddenLine xmlns="" xmlns:a14="http://schemas.microsoft.com/office/drawing/2010/main" w="9525">
                     <a:solidFill>
                       <a:srgbClr val="000000"/>
                     </a:solidFill>
@@ -10422,7 +10427,7 @@
               </a:ln>
               <a:extLst>
                 <a:ext uri="{91240B29-F687-4f45-9708-019B960494DF}">
-                  <a14:hiddenLine xmlns:a14="http://schemas.microsoft.com/office/drawing/2010/main" xmlns="" w="9525">
+                  <a14:hiddenLine xmlns="" xmlns:a14="http://schemas.microsoft.com/office/drawing/2010/main" w="9525">
                     <a:solidFill>
                       <a:srgbClr val="000000"/>
                     </a:solidFill>
@@ -10512,7 +10517,7 @@
               </a:ln>
               <a:extLst>
                 <a:ext uri="{91240B29-F687-4f45-9708-019B960494DF}">
-                  <a14:hiddenLine xmlns:a14="http://schemas.microsoft.com/office/drawing/2010/main" xmlns="" w="9525">
+                  <a14:hiddenLine xmlns="" xmlns:a14="http://schemas.microsoft.com/office/drawing/2010/main" w="9525">
                     <a:solidFill>
                       <a:srgbClr val="000000"/>
                     </a:solidFill>
@@ -10577,7 +10582,7 @@
               </a:ln>
               <a:extLst>
                 <a:ext uri="{91240B29-F687-4f45-9708-019B960494DF}">
-                  <a14:hiddenLine xmlns:a14="http://schemas.microsoft.com/office/drawing/2010/main" xmlns="" w="9525">
+                  <a14:hiddenLine xmlns="" xmlns:a14="http://schemas.microsoft.com/office/drawing/2010/main" w="9525">
                     <a:solidFill>
                       <a:srgbClr val="000000"/>
                     </a:solidFill>
@@ -10639,7 +10644,7 @@
               </a:ln>
               <a:extLst>
                 <a:ext uri="{91240B29-F687-4f45-9708-019B960494DF}">
-                  <a14:hiddenLine xmlns:a14="http://schemas.microsoft.com/office/drawing/2010/main" xmlns="" w="9525">
+                  <a14:hiddenLine xmlns="" xmlns:a14="http://schemas.microsoft.com/office/drawing/2010/main" w="9525">
                     <a:solidFill>
                       <a:srgbClr val="000000"/>
                     </a:solidFill>
@@ -10729,7 +10734,7 @@
               </a:ln>
               <a:extLst>
                 <a:ext uri="{91240B29-F687-4f45-9708-019B960494DF}">
-                  <a14:hiddenLine xmlns:a14="http://schemas.microsoft.com/office/drawing/2010/main" xmlns="" w="9525">
+                  <a14:hiddenLine xmlns="" xmlns:a14="http://schemas.microsoft.com/office/drawing/2010/main" w="9525">
                     <a:solidFill>
                       <a:srgbClr val="000000"/>
                     </a:solidFill>
@@ -10819,7 +10824,7 @@
               </a:ln>
               <a:extLst>
                 <a:ext uri="{91240B29-F687-4f45-9708-019B960494DF}">
-                  <a14:hiddenLine xmlns:a14="http://schemas.microsoft.com/office/drawing/2010/main" xmlns="" w="9525">
+                  <a14:hiddenLine xmlns="" xmlns:a14="http://schemas.microsoft.com/office/drawing/2010/main" w="9525">
                     <a:solidFill>
                       <a:srgbClr val="000000"/>
                     </a:solidFill>
@@ -10884,7 +10889,7 @@
               </a:ln>
               <a:extLst>
                 <a:ext uri="{91240B29-F687-4f45-9708-019B960494DF}">
-                  <a14:hiddenLine xmlns:a14="http://schemas.microsoft.com/office/drawing/2010/main" xmlns="" w="9525">
+                  <a14:hiddenLine xmlns="" xmlns:a14="http://schemas.microsoft.com/office/drawing/2010/main" w="9525">
                     <a:solidFill>
                       <a:srgbClr val="000000"/>
                     </a:solidFill>
@@ -11004,7 +11009,7 @@
               </a:ln>
               <a:extLst>
                 <a:ext uri="{91240B29-F687-4f45-9708-019B960494DF}">
-                  <a14:hiddenLine xmlns:a14="http://schemas.microsoft.com/office/drawing/2010/main" xmlns="" w="9525">
+                  <a14:hiddenLine xmlns="" xmlns:a14="http://schemas.microsoft.com/office/drawing/2010/main" w="9525">
                     <a:solidFill>
                       <a:srgbClr val="000000"/>
                     </a:solidFill>
@@ -11085,7 +11090,7 @@
               </a:ln>
               <a:extLst>
                 <a:ext uri="{91240B29-F687-4f45-9708-019B960494DF}">
-                  <a14:hiddenLine xmlns:a14="http://schemas.microsoft.com/office/drawing/2010/main" xmlns="" w="9525">
+                  <a14:hiddenLine xmlns="" xmlns:a14="http://schemas.microsoft.com/office/drawing/2010/main" w="9525">
                     <a:solidFill>
                       <a:srgbClr val="000000"/>
                     </a:solidFill>
@@ -11200,7 +11205,7 @@
               </a:ln>
               <a:extLst>
                 <a:ext uri="{91240B29-F687-4f45-9708-019B960494DF}">
-                  <a14:hiddenLine xmlns:a14="http://schemas.microsoft.com/office/drawing/2010/main" xmlns="" w="9525">
+                  <a14:hiddenLine xmlns="" xmlns:a14="http://schemas.microsoft.com/office/drawing/2010/main" w="9525">
                     <a:solidFill>
                       <a:srgbClr val="000000"/>
                     </a:solidFill>
@@ -11290,7 +11295,7 @@
               </a:ln>
               <a:extLst>
                 <a:ext uri="{91240B29-F687-4f45-9708-019B960494DF}">
-                  <a14:hiddenLine xmlns:a14="http://schemas.microsoft.com/office/drawing/2010/main" xmlns="" w="9525">
+                  <a14:hiddenLine xmlns="" xmlns:a14="http://schemas.microsoft.com/office/drawing/2010/main" w="9525">
                     <a:solidFill>
                       <a:srgbClr val="000000"/>
                     </a:solidFill>
@@ -11355,7 +11360,7 @@
               </a:ln>
               <a:extLst>
                 <a:ext uri="{91240B29-F687-4f45-9708-019B960494DF}">
-                  <a14:hiddenLine xmlns:a14="http://schemas.microsoft.com/office/drawing/2010/main" xmlns="" w="9525">
+                  <a14:hiddenLine xmlns="" xmlns:a14="http://schemas.microsoft.com/office/drawing/2010/main" w="9525">
                     <a:solidFill>
                       <a:srgbClr val="000000"/>
                     </a:solidFill>
@@ -11445,7 +11450,7 @@
               </a:ln>
               <a:extLst>
                 <a:ext uri="{91240B29-F687-4f45-9708-019B960494DF}">
-                  <a14:hiddenLine xmlns:a14="http://schemas.microsoft.com/office/drawing/2010/main" xmlns="" w="9525">
+                  <a14:hiddenLine xmlns="" xmlns:a14="http://schemas.microsoft.com/office/drawing/2010/main" w="9525">
                     <a:solidFill>
                       <a:srgbClr val="000000"/>
                     </a:solidFill>
@@ -11513,7 +11518,7 @@
               </a:ln>
               <a:extLst>
                 <a:ext uri="{91240B29-F687-4f45-9708-019B960494DF}">
-                  <a14:hiddenLine xmlns:a14="http://schemas.microsoft.com/office/drawing/2010/main" xmlns="" w="9525">
+                  <a14:hiddenLine xmlns="" xmlns:a14="http://schemas.microsoft.com/office/drawing/2010/main" w="9525">
                     <a:solidFill>
                       <a:srgbClr val="000000"/>
                     </a:solidFill>
@@ -11603,7 +11608,7 @@
               </a:ln>
               <a:extLst>
                 <a:ext uri="{91240B29-F687-4f45-9708-019B960494DF}">
-                  <a14:hiddenLine xmlns:a14="http://schemas.microsoft.com/office/drawing/2010/main" xmlns="" w="9525">
+                  <a14:hiddenLine xmlns="" xmlns:a14="http://schemas.microsoft.com/office/drawing/2010/main" w="9525">
                     <a:solidFill>
                       <a:srgbClr val="000000"/>
                     </a:solidFill>
@@ -11671,7 +11676,7 @@
               </a:ln>
               <a:extLst>
                 <a:ext uri="{91240B29-F687-4f45-9708-019B960494DF}">
-                  <a14:hiddenLine xmlns:a14="http://schemas.microsoft.com/office/drawing/2010/main" xmlns="" w="9525">
+                  <a14:hiddenLine xmlns="" xmlns:a14="http://schemas.microsoft.com/office/drawing/2010/main" w="9525">
                     <a:solidFill>
                       <a:srgbClr val="000000"/>
                     </a:solidFill>
@@ -11761,7 +11766,7 @@
               </a:ln>
               <a:extLst>
                 <a:ext uri="{91240B29-F687-4f45-9708-019B960494DF}">
-                  <a14:hiddenLine xmlns:a14="http://schemas.microsoft.com/office/drawing/2010/main" xmlns="" w="9525">
+                  <a14:hiddenLine xmlns="" xmlns:a14="http://schemas.microsoft.com/office/drawing/2010/main" w="9525">
                     <a:solidFill>
                       <a:srgbClr val="000000"/>
                     </a:solidFill>
@@ -11795,7 +11800,7 @@
               </a:ln>
               <a:extLst>
                 <a:ext uri="{91240B29-F687-4f45-9708-019B960494DF}">
-                  <a14:hiddenLine xmlns:a14="http://schemas.microsoft.com/office/drawing/2010/main" xmlns="" w="9525">
+                  <a14:hiddenLine xmlns="" xmlns:a14="http://schemas.microsoft.com/office/drawing/2010/main" w="9525">
                     <a:solidFill>
                       <a:srgbClr val="000000"/>
                     </a:solidFill>
@@ -11936,7 +11941,7 @@
             <a:fld id="{48A87A34-81AB-432B-8DAE-1953F412C126}" type="datetimeFigureOut">
               <a:rPr lang="en-US" dirty="0"/>
               <a:pPr/>
-              <a:t>11/19/2020</a:t>
+              <a:t>11/20/2020</a:t>
             </a:fld>
             <a:endParaRPr lang="en-US" dirty="0"/>
           </a:p>
@@ -12631,14 +12636,26 @@
           <a:lstStyle/>
           <a:p>
             <a:r>
-              <a:rPr lang="pt-PT" dirty="0"/>
+              <a:rPr lang="pt-PT" dirty="0">
+                <a:solidFill>
+                  <a:schemeClr val="bg1"/>
+                </a:solidFill>
+              </a:rPr>
               <a:t>Funcionalidades </a:t>
             </a:r>
             <a:r>
-              <a:rPr lang="pt-PT" dirty="0" err="1"/>
+              <a:rPr lang="pt-PT" dirty="0" err="1">
+                <a:solidFill>
+                  <a:schemeClr val="bg1"/>
+                </a:solidFill>
+              </a:rPr>
               <a:t>IMplementadas</a:t>
             </a:r>
-            <a:endParaRPr lang="pt-PT" dirty="0"/>
+            <a:endParaRPr lang="pt-PT" dirty="0">
+              <a:solidFill>
+                <a:schemeClr val="bg1"/>
+              </a:solidFill>
+            </a:endParaRPr>
           </a:p>
         </p:txBody>
       </p:sp>
@@ -14106,7 +14123,15 @@
           <a:p>
             <a:r>
               <a:rPr lang="pt-PT" sz="3600" dirty="0"/>
-              <a:t>http://www.plantuml.com/plantuml/svg/jLhFSjms3x_xANZQaJRAmJuxddn9linunaxIr4sdfmujqOfghRYbjCvutFRPIvDO0YIurgwJdYpYpuy0218Wrw_7IPffi-gFwbwEetXhHrA_DQhf9YqUZeHuASR9T4ChXitASntndPoKk9DzryX6MSgBMBKeCxGKg0eeEUb6RwvxnzMc4dEwm6_Lz64hKfIYriCuEVwTxXen8fTRKqPoNy2r8dBKopXIYp9y8iiy7svqeUqaIguMGcz5_ZuAaPvKgqqduo3hbGeSXnT6HPcCYGgB0ON9nC5BS8HhhNkXryh8IHlnwfKe0efOr2SbCR_lr30fPZpG7RaR9XTUFLZ-zSOE2Vl55g8een71ghO8EVSEyCgYEAtOb0m0bycu07dIcMaZUpJABpZ5l37MeoOJKt1r8UhZIk3WfAHg8NM2wkcfA80g5ZfeseKvvWlpMRNTECb6RrT8JbszZQSo6iJ683U69UiQkgXg9RkUh10Y5sMUp5Sm3c0LGSVRxhmfl0bavHoL1XPZ_lz7XDn20eTDb5ylbWFP0Fbag0qrRRSms_3lv7QxR8QnQmVLE8nx9Gsdhcoyld9o8-yTSINNftRimdlcXSVVBT5PvcOgIlATObIPoIfkbeS8SRcKQq3rETsDxW1CQ1VAYj6m9iQs5iZPUvdAHVDRiT-i2IY1bW07hMJQOPAiEh22vpi0tidxdBfdG211zOcacjtEGAsyZgyj2qZ__15YzIBPuqJt19Lpvy-ijX02i_QzDeEgLMDLsLcFF3yXZekIKTYfd9pdA9gFEZlQqSOB_OTyturTBMCRUrrZW-8tpIUZcysabv2CuwJhMwUg_Mm8LPICmc3f1f5D0-35TXAnzX_-5Fnp8uV9gObNufYg6hNITohH5ijvRSZKdz4BeftitejWDVE3BmWAHuknCvV82YpwasHfFWvzDoZnyEGYU24dSgTgYtvwPUGmobhgvPcO_BTMexS3OOkIKNBwKJ2-wc__w_khW8a-vbOJ8_hSTTnp1S5yp1wGoVXZLURC3-95-1BBYPixBuUnkD8PwQMOAe567nIaZpVV3pXgCmNTD_Ua-47NuxEsrgkrD0h31g8-WUdauKIa0Q59VNdzgxmN3xJ7lLAzyyjtIbwYAEa012ajkU944jXV87R-O8ma8eozxoANctxghkLGQ-ALKJVAgA66UmWHAaf6YHKudtfwfIVPLoAZWavz3emCD4O7nLXicEDYmHt_95kvKaEuwb8p7H9A56L2u3ubFdnvP10fO0EX1O7OSBXMxEq0R1CmdxRlj523bATJipq5xtXrTFK4T7GTXgp1xvgAm5OvG838D_Hf-p-eR-SDxnBGazqjGiR6sRZFhnawPDN380-1R7ftbjC-BLrOpyKwd498shEncy70vFcirlgnPeVq8MMy3v-UbVOqdXgVp9xc-iX6JZw7S9AYJ0bqkfkdZlmAGPCzXX0n6eWHMak5yol7-pU02OGMXR88FmMJYzY3EFrHB8893qlsRzP4u42dZj7Wzu_vbWqNtz3d0wnva1Fnoy6rCXzli8Pw4UJvCU_ndaoIbw75sIgTRRCC9c0dhIV3hNifQlBeX0VqKapTMeUX3mVs6sLA03Ynh2kyXitBLDpwnTsp5Ikq7tjuaXSgbnV0eKOZ2sOc5dW135-BGljqmalnx4xui6vvPkkWIZOaMAZXAzhHI6gfA4725iobDh9OCO6aH8ceDtrpRqKsDhIC_a6kSkJ7uXWRmFOTdIhNvK9eHfWxBWnBWOK1IIVbFDXvCuiabdiWWUlxO-tx9ieQzyKqMpEPnd4EvYGz8xUD9voJzA7a9dn-P-sC9YhA795CkpYmXXBLLarpxo_8Z-Syj4JcY-mFBtwuMcyszn_qD_6GgpGYBZN83uVbsRQunFpGsfrXYnjBXFfw9ep_r0a6jYDdhjqQ_G24oCj97pvdKyskERodt2Q4osw8Pe_Io3-nu1YUMNpeYZ8QPQnVsFQD66p7kgAcL94PpuDxmknWzVoa_r2NiCBbUtPUhV9oFtu_eMMyUliFRXj8pFxymZLdvl0d-5TLtwQ22nJyhv-Uo7d1WGvgt1z3KkkcQpLT5zwBeSgE5pQyo60llJ3RpyID_4N5PZhtPYzHZCnEyVb7j1auzaxyx7U-7smZlfGURip-sknzzfRc0VBWXCbjSzJ4NvVmX2gfA08bia1D8X5t0T58B4Lsiyqhv4gJlpXZTQ9kvY_O-ToXQacLzPiD1ZW1lwJiUy8XG5H7BGIES9h3tzZpjGWqa9JLmiR0AS28JP5_SGBNiUU8T7XlGdKpfvZhJ8pBkoBzXGHzPopOERiPJzcRg0HHZWRBpHaOCtPxIYy-E_dvorTqrIdJ7lANSzz5mb1S3quzS2EuP0YLCcayLjtGsH39Hfk8qokp8p1gh8swusnKPAk3QYaJbLYiKIbbeX8z5hAAN82RYJloAGaFafs4YwL0QRuW9zskX7kX36u1dmiX2rvkKm18ZmISdX3HEIJYrYOq236XO5E8H7oq8xJ8XwCWOLdkIdKKyGCLZF0K2E4HcXk0vUDa-2Hr-fTbk1-lKYBzvpscWRy4UNDaOY1IyBcE0g8m1Ch3flzwTFHQ3SrcrVyB</a:t>
+              <a:t>http://www.plantuml.com/plantuml/svg/jLhFSjms3x_xANZQaJRAmJuxddn9linunaxIr4sdfmujqOfghRYbjCvutFRPIvDO0YIurgwJdYpYpuy0218Wrw_7IPffi-gFwbwEetXhHrA_DQhf9YqUZeHuASR9T4ChXitASntndPoKk9DzryX6MSgBMBKeCxGKg0eeEUb6RwvxnzMc4dEwm6_Lz64hKfIYriCuEVwTxXen8fTRKqPoNy2r8dBKopXIYp9y8iiy7svqeUqaIguMGcz5_ZuAaPvKgqqduo3hbGeSXnT6HPcCYGgB0ON9nC5BS8HhhNkXryh8IHlnwfKe0efOr2SbCR_lr30fPZpG7RaR9XTUFLZ-zSOE2Vl55g8een71ghO8EVSEyCgYEAtOb0m0bycu07dIcMaZUpJABpZ5l37MeoOJKt1r8UhZIk3WfAHg8NM2wkcfA80g5ZfeseKvvWlpMRNTECb6RrT8JbszZQSo6iJ683U69UiQkgXg9RkUh10Y5sMUp5Sm3c0LGSVRxhmfl0bavHoL1XPZ_lz7XDn20eTDb5ylbWFP0Fbag0qrRRSms_3lv7QxR8QnQmVLE8nx9Gsdhcoyld9o8-yTSINNftRimdlcXSVVBT5PvcOgIlATObIPoIfkbeS8SRcKQq3rETsDxW1CQ1VAYj6m9iQs5iZPUvdAHVDRiT-i2IY1bW07hMJQOPAiEh22vpi0tidxdBfdG211zOcacjtEGAsyZgyj2qZ__15YzIBPuqJt19Lpvy-ijX02i_QzDeEgLMDLsLcFF3yXZekIKTYfd9pdA9gFEZlQqSOB_OTyturTBMCRUrrZW-8tpIUZcysabv2CuwJhMwUg_Mm8LPICmc3f1f5D0-35TXAnzX_-5Fnp8uV9gObNufYg6hNITohH5ijvRSZKdz4BeftitejWDVE3BmWAHuknCvV82YpwasHfFWvzDoZnyEGYU24dSgTgYtvwPUGmobhgvPcO_BTMexS3OOkIKNBwKJ2-wc__w_khW8a-vbOJ8_hSTTnp1S5yp1wGoVXZLURC3-95-1BBYPixBuUnkD8PwQMOAe567nIaZpVV3pXgCmNTD_Ua-47NuxEsrgkrD0h31g8-WUdauKIa0Q59VNdzgxmN3xJ7lLAzyyjtIbwYAEa012ajkU944jXV87R-O8ma8eozxoANctxghkLGQ-ALKJVAgA66UmWHAaf6YHKudtfwfIVPLoAZWavz3emCD4O7nLXicEDYmHt_95kvKaEuwb8p7H9A56L2u3ubFdnvP10fO0EX1O7OSBXMxEq0R1CmdxRlj523bATJipq5xtXrTFK4T7GTXgp1xvgAm5OvG838D_Hf-p-eR-SDxnBGazqjGiR6sRZFhnawPDN380-1R7ftbjC-BLrOpyKwd498shEncy70vFcirlgnPeVq8MMy3v-UbVOqdXgVp9xc-iX6JZw7S9AYJ0bqkfkdZlmAGPCzXX0n6eWHMak5yol7-pU02OGMXR88FmMJYzY3EFrHB8893qlsRzP4u42dZj7Wzu_vbWqNtz3d0wnva1Fnoy6rCXzli8Pw4UJvCU_</a:t>
+            </a:r>
+            <a:r>
+              <a:rPr lang="pt-PT" sz="3600" u="sng" dirty="0"/>
+              <a:t>ndaoIbw75sIgTRRCC9c0dhIV3hNifQlBeX0VqKapTMeUX3mVs6sLA03Ynh2kyXitBLDpwnTsp5Ikq7tjuaXSgbnV0eKOZ2sOc5dW135-BGljqmalnx4xui6vvPkkWIZOaMAZXAzhHI6gfA4725iobDh9OCO6aH8ceDtrpRqKsDhIC</a:t>
+            </a:r>
+            <a:r>
+              <a:rPr lang="pt-PT" sz="3600" dirty="0"/>
+              <a:t>_a6kSkJ7uXWRmFOTdIhNvK9eHfWxBWnBWOK1IIVbFDXvCuiabdiWWUlxO-tx9ieQzyKqMpEPnd4EvYGz8xUD9voJzA7a9dn-P-sC9YhA795CkpYmXXBLLarpxo_8Z-Syj4JcY-mFBtwuMcyszn_qD_6GgpGYBZN83uVbsRQunFpGsfrXYnjBXFfw9ep_r0a6jYDdhjqQ_G24oCj97pvdKyskERodt2Q4osw8Pe_Io3-nu1YUMNpeYZ8QPQnVsFQD66p7kgAcL94PpuDxmknWzVoa_r2NiCBbUtPUhV9oFtu_eMMyUliFRXj8pFxymZLdvl0d-5TLtwQ22nJyhv-Uo7d1WGvgt1z3KkkcQpLT5zwBeSgE5pQyo60llJ3RpyID_4N5PZhtPYzHZCnEyVb7j1auzaxyx7U-7smZlfGURip-sknzzfRc0VBWXCbjSzJ4NvVmX2gfA08bia1D8X5t0T58B4Lsiyqhv4gJlpXZTQ9kvY_O-ToXQacLzPiD1ZW1lwJiUy8XG5H7BGIES9h3tzZpjGWqa9JLmiR0AS28JP5_SGBNiUU8T7XlGdKpfvZhJ8pBkoBzXGHzPopOERiPJzcRg0HHZWRBpHaOCtPxIYy-E_dvorTqrIdJ7lANSzz5mb1S3quzS2EuP0YLCcayLjtGsH39Hfk8qokp8p1gh8swusnKPAk3QYaJbLYiKIbbeX8z5hAAN82RYJloAGaFafs4YwL0QRuW9zskX7kX36u1dmiX2rvkKm18ZmISdX3HEIJYrYOq236XO5E8H7oq8xJ8XwCWOLdkIdKKyGCLZF0K2E4HcXk0vUDa-2Hr-fTbk1-lKYBzvpscWRy4UNDaOY1IyBcE0g8m1Ch3flzwTFHQ3SrcrVyB</a:t>
             </a:r>
           </a:p>
           <a:p>

</xml_diff>